<commit_message>
Changed a bit the slides as we went on. Add asyncawait demo
</commit_message>
<xml_diff>
--- a/Slides/3. Day 2 - OOP, Unit Tests, Collections.pptx
+++ b/Slides/3. Day 2 - OOP, Unit Tests, Collections.pptx
@@ -21439,6 +21439,33 @@
             </a:pPr>
             <a:r>
               <a:rPr lang="en-US" dirty="0"/>
+              <a:t>What do we mock? The closest to the real thing, don’t mock unnecessary things</a:t>
+            </a:r>
+          </a:p>
+          <a:p>
+            <a:pPr marL="0" lvl="0" indent="0" algn="l" rtl="0">
+              <a:spcBef>
+                <a:spcPts val="0"/>
+              </a:spcBef>
+              <a:spcAft>
+                <a:spcPts val="0"/>
+              </a:spcAft>
+              <a:buNone/>
+            </a:pPr>
+            <a:endParaRPr lang="en-US" dirty="0"/>
+          </a:p>
+          <a:p>
+            <a:pPr marL="0" lvl="0" indent="0" algn="l" rtl="0">
+              <a:spcBef>
+                <a:spcPts val="0"/>
+              </a:spcBef>
+              <a:spcAft>
+                <a:spcPts val="0"/>
+              </a:spcAft>
+              <a:buNone/>
+            </a:pPr>
+            <a:r>
+              <a:rPr lang="en-US" dirty="0"/>
               <a:t>Install </a:t>
             </a:r>
             <a:r>
@@ -23200,7 +23227,7 @@
             <a:fld id="{B61BEF0D-F0BB-DE4B-95CE-6DB70DBA9567}" type="datetimeFigureOut">
               <a:rPr lang="en-US" dirty="0"/>
               <a:pPr/>
-              <a:t>6/7/2025</a:t>
+              <a:t>6/8/2025</a:t>
             </a:fld>
             <a:endParaRPr lang="en-US" dirty="0"/>
           </a:p>
@@ -23462,7 +23489,7 @@
             <a:fld id="{B61BEF0D-F0BB-DE4B-95CE-6DB70DBA9567}" type="datetimeFigureOut">
               <a:rPr lang="en-US" dirty="0"/>
               <a:pPr/>
-              <a:t>6/7/2025</a:t>
+              <a:t>6/8/2025</a:t>
             </a:fld>
             <a:endParaRPr lang="en-US" dirty="0"/>
           </a:p>
@@ -23787,7 +23814,7 @@
             <a:fld id="{B61BEF0D-F0BB-DE4B-95CE-6DB70DBA9567}" type="datetimeFigureOut">
               <a:rPr lang="en-US" dirty="0"/>
               <a:pPr/>
-              <a:t>6/7/2025</a:t>
+              <a:t>6/8/2025</a:t>
             </a:fld>
             <a:endParaRPr lang="en-US" dirty="0"/>
           </a:p>
@@ -24139,7 +24166,7 @@
             <a:fld id="{B61BEF0D-F0BB-DE4B-95CE-6DB70DBA9567}" type="datetimeFigureOut">
               <a:rPr lang="en-US" dirty="0"/>
               <a:pPr/>
-              <a:t>6/7/2025</a:t>
+              <a:t>6/8/2025</a:t>
             </a:fld>
             <a:endParaRPr lang="en-US" dirty="0"/>
           </a:p>
@@ -24464,7 +24491,7 @@
             <a:fld id="{B61BEF0D-F0BB-DE4B-95CE-6DB70DBA9567}" type="datetimeFigureOut">
               <a:rPr lang="en-US" dirty="0"/>
               <a:pPr/>
-              <a:t>6/7/2025</a:t>
+              <a:t>6/8/2025</a:t>
             </a:fld>
             <a:endParaRPr lang="en-US" dirty="0"/>
           </a:p>
@@ -24868,7 +24895,7 @@
             <a:fld id="{B61BEF0D-F0BB-DE4B-95CE-6DB70DBA9567}" type="datetimeFigureOut">
               <a:rPr lang="en-US" dirty="0"/>
               <a:pPr/>
-              <a:t>6/7/2025</a:t>
+              <a:t>6/8/2025</a:t>
             </a:fld>
             <a:endParaRPr lang="en-US" dirty="0"/>
           </a:p>
@@ -25048,7 +25075,7 @@
           <a:p>
             <a:fld id="{55C6B4A9-1611-4792-9094-5F34BCA07E0B}" type="datetimeFigureOut">
               <a:rPr lang="en-US" dirty="0"/>
-              <a:t>6/7/2025</a:t>
+              <a:t>6/8/2025</a:t>
             </a:fld>
             <a:endParaRPr lang="en-US" dirty="0"/>
           </a:p>
@@ -25239,7 +25266,7 @@
             <a:fld id="{B61BEF0D-F0BB-DE4B-95CE-6DB70DBA9567}" type="datetimeFigureOut">
               <a:rPr lang="en-US" dirty="0"/>
               <a:pPr/>
-              <a:t>6/7/2025</a:t>
+              <a:t>6/8/2025</a:t>
             </a:fld>
             <a:endParaRPr lang="en-US" dirty="0"/>
           </a:p>
@@ -26031,7 +26058,7 @@
             <a:fld id="{B61BEF0D-F0BB-DE4B-95CE-6DB70DBA9567}" type="datetimeFigureOut">
               <a:rPr lang="en-US" dirty="0"/>
               <a:pPr/>
-              <a:t>6/7/2025</a:t>
+              <a:t>6/8/2025</a:t>
             </a:fld>
             <a:endParaRPr lang="en-US" dirty="0"/>
           </a:p>
@@ -26289,7 +26316,7 @@
             <a:fld id="{B61BEF0D-F0BB-DE4B-95CE-6DB70DBA9567}" type="datetimeFigureOut">
               <a:rPr lang="en-US" dirty="0"/>
               <a:pPr/>
-              <a:t>6/7/2025</a:t>
+              <a:t>6/8/2025</a:t>
             </a:fld>
             <a:endParaRPr lang="en-US" dirty="0"/>
           </a:p>
@@ -26531,7 +26558,7 @@
           <a:p>
             <a:fld id="{EB712588-04B1-427B-82EE-E8DB90309F08}" type="datetimeFigureOut">
               <a:rPr lang="en-US" dirty="0"/>
-              <a:t>6/7/2025</a:t>
+              <a:t>6/8/2025</a:t>
             </a:fld>
             <a:endParaRPr lang="en-US" dirty="0"/>
           </a:p>
@@ -26916,7 +26943,7 @@
             <a:fld id="{B61BEF0D-F0BB-DE4B-95CE-6DB70DBA9567}" type="datetimeFigureOut">
               <a:rPr lang="en-US" dirty="0"/>
               <a:pPr/>
-              <a:t>6/7/2025</a:t>
+              <a:t>6/8/2025</a:t>
             </a:fld>
             <a:endParaRPr lang="en-US" dirty="0"/>
           </a:p>
@@ -27050,7 +27077,7 @@
             <a:fld id="{B61BEF0D-F0BB-DE4B-95CE-6DB70DBA9567}" type="datetimeFigureOut">
               <a:rPr lang="en-US" dirty="0"/>
               <a:pPr/>
-              <a:t>6/7/2025</a:t>
+              <a:t>6/8/2025</a:t>
             </a:fld>
             <a:endParaRPr lang="en-US" dirty="0"/>
           </a:p>
@@ -27156,7 +27183,7 @@
             <a:fld id="{B61BEF0D-F0BB-DE4B-95CE-6DB70DBA9567}" type="datetimeFigureOut">
               <a:rPr lang="en-US" dirty="0"/>
               <a:pPr/>
-              <a:t>6/7/2025</a:t>
+              <a:t>6/8/2025</a:t>
             </a:fld>
             <a:endParaRPr lang="en-US" dirty="0"/>
           </a:p>
@@ -27420,7 +27447,7 @@
           <a:p>
             <a:fld id="{42A54C80-263E-416B-A8E0-580EDEADCBDC}" type="datetimeFigureOut">
               <a:rPr lang="en-US" dirty="0"/>
-              <a:t>6/7/2025</a:t>
+              <a:t>6/8/2025</a:t>
             </a:fld>
             <a:endParaRPr lang="en-US" dirty="0"/>
           </a:p>
@@ -27694,7 +27721,7 @@
             <a:fld id="{B61BEF0D-F0BB-DE4B-95CE-6DB70DBA9567}" type="datetimeFigureOut">
               <a:rPr lang="en-US" dirty="0"/>
               <a:pPr/>
-              <a:t>6/7/2025</a:t>
+              <a:t>6/8/2025</a:t>
             </a:fld>
             <a:endParaRPr lang="en-US" dirty="0"/>
           </a:p>
@@ -28448,7 +28475,7 @@
             <a:fld id="{B61BEF0D-F0BB-DE4B-95CE-6DB70DBA9567}" type="datetimeFigureOut">
               <a:rPr lang="en-US" dirty="0"/>
               <a:pPr/>
-              <a:t>6/7/2025</a:t>
+              <a:t>6/8/2025</a:t>
             </a:fld>
             <a:endParaRPr lang="en-US" dirty="0"/>
           </a:p>

</xml_diff>